<commit_message>
update env and yt link
</commit_message>
<xml_diff>
--- a/documents/Team Working Agreement.pptx
+++ b/documents/Team Working Agreement.pptx
@@ -221,7 +221,7 @@
           <a:p>
             <a:fld id="{9410D272-305C-421E-A9EF-95D63D599B42}" type="datetimeFigureOut">
               <a:rPr lang="en-US" smtClean="0"/>
-              <a:t>3/3/23</a:t>
+              <a:t>3/6/23</a:t>
             </a:fld>
             <a:endParaRPr lang="en-US" dirty="0"/>
           </a:p>
@@ -398,7 +398,7 @@
           <a:p>
             <a:fld id="{05E16E63-7886-43BC-8DD4-4F14C3DD7360}" type="datetimeFigureOut">
               <a:rPr lang="en-US" smtClean="0"/>
-              <a:t>3/3/23</a:t>
+              <a:t>3/6/23</a:t>
             </a:fld>
             <a:endParaRPr lang="en-US" dirty="0"/>
           </a:p>
@@ -4801,7 +4801,9 @@
         </p:nvSpPr>
         <p:spPr/>
         <p:txBody>
-          <a:bodyPr/>
+          <a:bodyPr>
+            <a:normAutofit lnSpcReduction="10000"/>
+          </a:bodyPr>
           <a:lstStyle/>
           <a:p>
             <a:r>
@@ -4814,6 +4816,13 @@
             <a:r>
               <a:rPr lang="en-US" dirty="0"/>
               <a:t>It is expected of all members of the team to arrive promptly for meetings and actively participate during the meeting.</a:t>
+            </a:r>
+          </a:p>
+          <a:p>
+            <a:pPr lvl="1"/>
+            <a:r>
+              <a:rPr lang="en-US" dirty="0"/>
+              <a:t>Daily participation in the sprint cycles is required.</a:t>
             </a:r>
           </a:p>
           <a:p>
@@ -5668,6 +5677,15 @@
 </file>
 
 <file path=customXml/item2.xml><?xml version="1.0" encoding="utf-8"?>
+<?mso-contentType ?>
+<FormTemplates xmlns="http://schemas.microsoft.com/sharepoint/v3/contenttype/forms">
+  <Display>DocumentLibraryForm</Display>
+  <Edit>DocumentLibraryForm</Edit>
+  <New>DocumentLibraryForm</New>
+</FormTemplates>
+</file>
+
+<file path=customXml/item3.xml><?xml version="1.0" encoding="utf-8"?>
 <ct:contentTypeSchema xmlns:ct="http://schemas.microsoft.com/office/2006/metadata/contentType" xmlns:ma="http://schemas.microsoft.com/office/2006/metadata/properties/metaAttributes" ct:_="" ma:_="" ma:contentTypeName="Document" ma:contentTypeID="0x01010079F111ED35F8CC479449609E8A0923A6" ma:contentTypeVersion="20" ma:contentTypeDescription="Create a new document." ma:contentTypeScope="" ma:versionID="1267097ee5f5874adfcc408041ae252e">
   <xsd:schema xmlns:xsd="http://www.w3.org/2001/XMLSchema" xmlns:xs="http://www.w3.org/2001/XMLSchema" xmlns:p="http://schemas.microsoft.com/office/2006/metadata/properties" xmlns:ns1="http://schemas.microsoft.com/sharepoint/v3" xmlns:ns2="71af3243-3dd4-4a8d-8c0d-dd76da1f02a5" xmlns:ns3="16c05727-aa75-4e4a-9b5f-8a80a1165891" xmlns:ns4="230e9df3-be65-4c73-a93b-d1236ebd677e" targetNamespace="http://schemas.microsoft.com/office/2006/metadata/properties" ma:root="true" ma:fieldsID="395891a93df65b14727750f2c06c306c" ns1:_="" ns2:_="" ns3:_="" ns4:_="">
     <xsd:import namespace="http://schemas.microsoft.com/sharepoint/v3"/>
@@ -5943,15 +5961,6 @@
 </ct:contentTypeSchema>
 </file>
 
-<file path=customXml/item3.xml><?xml version="1.0" encoding="utf-8"?>
-<?mso-contentType ?>
-<FormTemplates xmlns="http://schemas.microsoft.com/sharepoint/v3/contenttype/forms">
-  <Display>DocumentLibraryForm</Display>
-  <Edit>DocumentLibraryForm</Edit>
-  <New>DocumentLibraryForm</New>
-</FormTemplates>
-</file>
-
 <file path=customXml/itemProps1.xml><?xml version="1.0" encoding="utf-8"?>
 <ds:datastoreItem xmlns:ds="http://schemas.openxmlformats.org/officeDocument/2006/customXml" ds:itemID="{42A742F3-D2BE-4CC5-9066-2DB838FE2FFD}">
   <ds:schemaRefs>
@@ -5965,6 +5974,14 @@
 </file>
 
 <file path=customXml/itemProps2.xml><?xml version="1.0" encoding="utf-8"?>
+<ds:datastoreItem xmlns:ds="http://schemas.openxmlformats.org/officeDocument/2006/customXml" ds:itemID="{959152A6-D9F2-46C7-B217-D613495E7AFF}">
+  <ds:schemaRefs>
+    <ds:schemaRef ds:uri="http://schemas.microsoft.com/sharepoint/v3/contenttype/forms"/>
+  </ds:schemaRefs>
+</ds:datastoreItem>
+</file>
+
+<file path=customXml/itemProps3.xml><?xml version="1.0" encoding="utf-8"?>
 <ds:datastoreItem xmlns:ds="http://schemas.openxmlformats.org/officeDocument/2006/customXml" ds:itemID="{AD1F2201-AEB8-4954-A8CB-3AC4242CC73C}">
   <ds:schemaRefs>
     <ds:schemaRef ds:uri="http://schemas.microsoft.com/office/2006/metadata/contentType"/>
@@ -5985,14 +6002,6 @@
 </ds:datastoreItem>
 </file>
 
-<file path=customXml/itemProps3.xml><?xml version="1.0" encoding="utf-8"?>
-<ds:datastoreItem xmlns:ds="http://schemas.openxmlformats.org/officeDocument/2006/customXml" ds:itemID="{959152A6-D9F2-46C7-B217-D613495E7AFF}">
-  <ds:schemaRefs>
-    <ds:schemaRef ds:uri="http://schemas.microsoft.com/sharepoint/v3/contenttype/forms"/>
-  </ds:schemaRefs>
-</ds:datastoreItem>
-</file>
-
 <file path=docMetadata/LabelInfo.xml><?xml version="1.0" encoding="utf-8"?>
 <clbl:labelList xmlns:clbl="http://schemas.microsoft.com/office/2020/mipLabelMetadata">
   <clbl:label id="{f42aa342-8706-4288-bd11-ebb85995028c}" enabled="1" method="Standard" siteId="{72f988bf-86f1-41af-91ab-2d7cd011db47}" contentBits="0" removed="0"/>

</xml_diff>